<commit_message>
aanpassingen demo.ppt en nieuwe data heartbeat demo plot + color modifications
</commit_message>
<xml_diff>
--- a/Verslagen/intermediate demo.pptx
+++ b/Verslagen/intermediate demo.pptx
@@ -4,6 +4,9 @@
   <p:sldMasterIdLst>
     <p:sldMasterId id="2147483648" r:id="rId1"/>
   </p:sldMasterIdLst>
+  <p:notesMasterIdLst>
+    <p:notesMasterId r:id="rId12"/>
+  </p:notesMasterIdLst>
   <p:sldIdLst>
     <p:sldId id="256" r:id="rId2"/>
     <p:sldId id="262" r:id="rId3"/>
@@ -1077,6 +1080,13 @@
         </dgm:presLayoutVars>
       </dgm:prSet>
       <dgm:spPr/>
+      <dgm:t>
+        <a:bodyPr/>
+        <a:lstStyle/>
+        <a:p>
+          <a:endParaRPr lang="nl-NL"/>
+        </a:p>
+      </dgm:t>
     </dgm:pt>
     <dgm:pt modelId="{D55107E7-7B18-47C9-BBE5-4FFDE439A139}" type="pres">
       <dgm:prSet presAssocID="{1C0E55F7-5FB2-4E48-8149-913E77520486}" presName="root1" presStyleCnt="0"/>
@@ -1089,6 +1099,13 @@
         </dgm:presLayoutVars>
       </dgm:prSet>
       <dgm:spPr/>
+      <dgm:t>
+        <a:bodyPr/>
+        <a:lstStyle/>
+        <a:p>
+          <a:endParaRPr lang="nl-NL"/>
+        </a:p>
+      </dgm:t>
     </dgm:pt>
     <dgm:pt modelId="{19399A10-7F5B-467B-82D0-2BB2693584D2}" type="pres">
       <dgm:prSet presAssocID="{1C0E55F7-5FB2-4E48-8149-913E77520486}" presName="level2hierChild" presStyleCnt="0"/>
@@ -1097,10 +1114,24 @@
     <dgm:pt modelId="{2DF3C455-C390-4894-945C-5945CEDF0695}" type="pres">
       <dgm:prSet presAssocID="{C9578D12-980E-4D95-810E-BC0A9848635E}" presName="conn2-1" presStyleLbl="parChTrans1D2" presStyleIdx="0" presStyleCnt="2"/>
       <dgm:spPr/>
+      <dgm:t>
+        <a:bodyPr/>
+        <a:lstStyle/>
+        <a:p>
+          <a:endParaRPr lang="nl-NL"/>
+        </a:p>
+      </dgm:t>
     </dgm:pt>
     <dgm:pt modelId="{4F19358C-CCDF-4C4F-862A-0F4BA4AA4FD2}" type="pres">
       <dgm:prSet presAssocID="{C9578D12-980E-4D95-810E-BC0A9848635E}" presName="connTx" presStyleLbl="parChTrans1D2" presStyleIdx="0" presStyleCnt="2"/>
       <dgm:spPr/>
+      <dgm:t>
+        <a:bodyPr/>
+        <a:lstStyle/>
+        <a:p>
+          <a:endParaRPr lang="nl-NL"/>
+        </a:p>
+      </dgm:t>
     </dgm:pt>
     <dgm:pt modelId="{2DB1B280-F4A4-43BD-86B0-2A74D406B232}" type="pres">
       <dgm:prSet presAssocID="{276A363E-C704-4D52-9F85-35548A6AA593}" presName="root2" presStyleCnt="0"/>
@@ -1128,10 +1159,24 @@
     <dgm:pt modelId="{6CBF796B-60DB-48FC-99B1-668282A960CE}" type="pres">
       <dgm:prSet presAssocID="{779B853E-8E32-480B-8726-6D7F90F79F45}" presName="conn2-1" presStyleLbl="parChTrans1D3" presStyleIdx="0" presStyleCnt="2"/>
       <dgm:spPr/>
+      <dgm:t>
+        <a:bodyPr/>
+        <a:lstStyle/>
+        <a:p>
+          <a:endParaRPr lang="nl-NL"/>
+        </a:p>
+      </dgm:t>
     </dgm:pt>
     <dgm:pt modelId="{26C445C5-4FF3-4917-9A53-77D0B357F9B8}" type="pres">
       <dgm:prSet presAssocID="{779B853E-8E32-480B-8726-6D7F90F79F45}" presName="connTx" presStyleLbl="parChTrans1D3" presStyleIdx="0" presStyleCnt="2"/>
       <dgm:spPr/>
+      <dgm:t>
+        <a:bodyPr/>
+        <a:lstStyle/>
+        <a:p>
+          <a:endParaRPr lang="nl-NL"/>
+        </a:p>
+      </dgm:t>
     </dgm:pt>
     <dgm:pt modelId="{209CEF6F-50E5-4483-B9B9-EBBA619DC86F}" type="pres">
       <dgm:prSet presAssocID="{D6591959-5F0F-489A-8468-D242C17A36C8}" presName="root2" presStyleCnt="0"/>
@@ -1159,10 +1204,24 @@
     <dgm:pt modelId="{67F8769C-B753-45D8-B0B1-EC206E48ED9F}" type="pres">
       <dgm:prSet presAssocID="{DD4D1D16-CBD2-43EE-A7C9-814070E34D3A}" presName="conn2-1" presStyleLbl="parChTrans1D2" presStyleIdx="1" presStyleCnt="2"/>
       <dgm:spPr/>
+      <dgm:t>
+        <a:bodyPr/>
+        <a:lstStyle/>
+        <a:p>
+          <a:endParaRPr lang="nl-NL"/>
+        </a:p>
+      </dgm:t>
     </dgm:pt>
     <dgm:pt modelId="{89372812-2771-4395-9F3B-247111C80A40}" type="pres">
       <dgm:prSet presAssocID="{DD4D1D16-CBD2-43EE-A7C9-814070E34D3A}" presName="connTx" presStyleLbl="parChTrans1D2" presStyleIdx="1" presStyleCnt="2"/>
       <dgm:spPr/>
+      <dgm:t>
+        <a:bodyPr/>
+        <a:lstStyle/>
+        <a:p>
+          <a:endParaRPr lang="nl-NL"/>
+        </a:p>
+      </dgm:t>
     </dgm:pt>
     <dgm:pt modelId="{A675C39C-983D-4040-B501-7B6DB9C0B300}" type="pres">
       <dgm:prSet presAssocID="{8532AD7D-7EE2-4007-A3F5-FD348991FF6F}" presName="root2" presStyleCnt="0"/>
@@ -1190,10 +1249,24 @@
     <dgm:pt modelId="{4EB53B17-163D-4E4E-99AA-789A7AB458C4}" type="pres">
       <dgm:prSet presAssocID="{F82C1CBE-91A2-4EF8-A552-08262AC94C07}" presName="conn2-1" presStyleLbl="parChTrans1D3" presStyleIdx="1" presStyleCnt="2"/>
       <dgm:spPr/>
+      <dgm:t>
+        <a:bodyPr/>
+        <a:lstStyle/>
+        <a:p>
+          <a:endParaRPr lang="nl-NL"/>
+        </a:p>
+      </dgm:t>
     </dgm:pt>
     <dgm:pt modelId="{1A7D3E5A-6333-4372-90E5-93AD86B30A4A}" type="pres">
       <dgm:prSet presAssocID="{F82C1CBE-91A2-4EF8-A552-08262AC94C07}" presName="connTx" presStyleLbl="parChTrans1D3" presStyleIdx="1" presStyleCnt="2"/>
       <dgm:spPr/>
+      <dgm:t>
+        <a:bodyPr/>
+        <a:lstStyle/>
+        <a:p>
+          <a:endParaRPr lang="nl-NL"/>
+        </a:p>
+      </dgm:t>
     </dgm:pt>
     <dgm:pt modelId="{58BC4E71-FA4A-466D-9CAC-A2798FEC92AC}" type="pres">
       <dgm:prSet presAssocID="{15BB76D7-2BDA-4EDE-8F73-9D4BB2CD4971}" presName="root2" presStyleCnt="0"/>
@@ -1220,25 +1293,25 @@
     </dgm:pt>
   </dgm:ptLst>
   <dgm:cxnLst>
+    <dgm:cxn modelId="{3E6931BD-56DC-445E-B034-1F0A9324CEF5}" type="presOf" srcId="{DD4D1D16-CBD2-43EE-A7C9-814070E34D3A}" destId="{89372812-2771-4395-9F3B-247111C80A40}" srcOrd="1" destOrd="0" presId="urn:microsoft.com/office/officeart/2005/8/layout/hierarchy2"/>
+    <dgm:cxn modelId="{12350B6C-4924-4064-BA0D-D6DAE6DD3551}" type="presOf" srcId="{DD4D1D16-CBD2-43EE-A7C9-814070E34D3A}" destId="{67F8769C-B753-45D8-B0B1-EC206E48ED9F}" srcOrd="0" destOrd="0" presId="urn:microsoft.com/office/officeart/2005/8/layout/hierarchy2"/>
+    <dgm:cxn modelId="{302FEF1B-2DB6-4BCC-82E0-49245D471E4B}" type="presOf" srcId="{15BB76D7-2BDA-4EDE-8F73-9D4BB2CD4971}" destId="{30A78D99-01E9-4FD6-B365-8A0A655DF402}" srcOrd="0" destOrd="0" presId="urn:microsoft.com/office/officeart/2005/8/layout/hierarchy2"/>
+    <dgm:cxn modelId="{EE2626C9-1E79-40BD-943C-4ADAE9826321}" type="presOf" srcId="{D6591959-5F0F-489A-8468-D242C17A36C8}" destId="{C79BEA28-5F21-4532-9188-1C7ABAA70D8F}" srcOrd="0" destOrd="0" presId="urn:microsoft.com/office/officeart/2005/8/layout/hierarchy2"/>
+    <dgm:cxn modelId="{E294910F-1EC7-43F8-972B-8CC0404A3C30}" type="presOf" srcId="{1C0E55F7-5FB2-4E48-8149-913E77520486}" destId="{D50786B4-76D4-4E84-96A2-43CA01A74DF8}" srcOrd="0" destOrd="0" presId="urn:microsoft.com/office/officeart/2005/8/layout/hierarchy2"/>
+    <dgm:cxn modelId="{41511535-6B13-46C2-A701-A47E7FA6CA61}" type="presOf" srcId="{8532AD7D-7EE2-4007-A3F5-FD348991FF6F}" destId="{6ADDB12E-F225-4DAA-8EEF-D28B268A5EC0}" srcOrd="0" destOrd="0" presId="urn:microsoft.com/office/officeart/2005/8/layout/hierarchy2"/>
+    <dgm:cxn modelId="{27AF9362-E21F-451C-A964-D53F36723BDA}" srcId="{276A363E-C704-4D52-9F85-35548A6AA593}" destId="{D6591959-5F0F-489A-8468-D242C17A36C8}" srcOrd="0" destOrd="0" parTransId="{779B853E-8E32-480B-8726-6D7F90F79F45}" sibTransId="{11B1830F-1949-43B7-A28A-33CB04060664}"/>
+    <dgm:cxn modelId="{026A628E-BCB1-47DE-AF6D-036DA013FFD5}" type="presOf" srcId="{F82C1CBE-91A2-4EF8-A552-08262AC94C07}" destId="{4EB53B17-163D-4E4E-99AA-789A7AB458C4}" srcOrd="0" destOrd="0" presId="urn:microsoft.com/office/officeart/2005/8/layout/hierarchy2"/>
+    <dgm:cxn modelId="{EBDF1461-CA97-4833-A590-8DD626B23D7E}" type="presOf" srcId="{779B853E-8E32-480B-8726-6D7F90F79F45}" destId="{26C445C5-4FF3-4917-9A53-77D0B357F9B8}" srcOrd="1" destOrd="0" presId="urn:microsoft.com/office/officeart/2005/8/layout/hierarchy2"/>
+    <dgm:cxn modelId="{40D62DF1-BF91-4B62-9E0E-3628428104F0}" srcId="{1C0E55F7-5FB2-4E48-8149-913E77520486}" destId="{8532AD7D-7EE2-4007-A3F5-FD348991FF6F}" srcOrd="1" destOrd="0" parTransId="{DD4D1D16-CBD2-43EE-A7C9-814070E34D3A}" sibTransId="{C4059019-8137-4DB8-AF28-E6FFB55C576F}"/>
+    <dgm:cxn modelId="{A587323E-FBE6-426F-8637-91A927CE26F2}" type="presOf" srcId="{276A363E-C704-4D52-9F85-35548A6AA593}" destId="{AA82381F-3358-4A1A-9B68-C283C04A3CEB}" srcOrd="0" destOrd="0" presId="urn:microsoft.com/office/officeart/2005/8/layout/hierarchy2"/>
+    <dgm:cxn modelId="{AF24CD37-0DF9-45C0-AF15-642EC0DAA77E}" srcId="{8532AD7D-7EE2-4007-A3F5-FD348991FF6F}" destId="{15BB76D7-2BDA-4EDE-8F73-9D4BB2CD4971}" srcOrd="0" destOrd="0" parTransId="{F82C1CBE-91A2-4EF8-A552-08262AC94C07}" sibTransId="{444924F7-DEC1-4773-8E01-3AA584BF6495}"/>
+    <dgm:cxn modelId="{DA2A0E92-B307-48E4-B1C2-C75EED2E8CD2}" type="presOf" srcId="{F82C1CBE-91A2-4EF8-A552-08262AC94C07}" destId="{1A7D3E5A-6333-4372-90E5-93AD86B30A4A}" srcOrd="1" destOrd="0" presId="urn:microsoft.com/office/officeart/2005/8/layout/hierarchy2"/>
+    <dgm:cxn modelId="{B421108B-6A37-46D2-8F4E-7F31E0A9D32F}" srcId="{58034E90-686B-4E9C-8AEB-2433A1E08532}" destId="{1C0E55F7-5FB2-4E48-8149-913E77520486}" srcOrd="0" destOrd="0" parTransId="{250126AC-706A-4CAF-AFC6-19E3D386D61D}" sibTransId="{138B2F27-93A1-4B70-8DBB-133DAC434903}"/>
+    <dgm:cxn modelId="{21BD81D8-CC54-4DF9-9E22-187FF8B3E52E}" type="presOf" srcId="{C9578D12-980E-4D95-810E-BC0A9848635E}" destId="{4F19358C-CCDF-4C4F-862A-0F4BA4AA4FD2}" srcOrd="1" destOrd="0" presId="urn:microsoft.com/office/officeart/2005/8/layout/hierarchy2"/>
+    <dgm:cxn modelId="{CE40A55A-ECFD-4168-91EE-B8C494101F3E}" srcId="{1C0E55F7-5FB2-4E48-8149-913E77520486}" destId="{276A363E-C704-4D52-9F85-35548A6AA593}" srcOrd="0" destOrd="0" parTransId="{C9578D12-980E-4D95-810E-BC0A9848635E}" sibTransId="{329C8A27-588C-434B-A7D9-B1144CC485D6}"/>
+    <dgm:cxn modelId="{83AE0AC5-BF21-492B-8AC5-0EDD38FBDEE3}" type="presOf" srcId="{58034E90-686B-4E9C-8AEB-2433A1E08532}" destId="{6F16B71C-2660-4279-AAE8-8E2A2C798710}" srcOrd="0" destOrd="0" presId="urn:microsoft.com/office/officeart/2005/8/layout/hierarchy2"/>
     <dgm:cxn modelId="{004107B0-E35A-4CCF-B519-AEECD9E23E42}" type="presOf" srcId="{C9578D12-980E-4D95-810E-BC0A9848635E}" destId="{2DF3C455-C390-4894-945C-5945CEDF0695}" srcOrd="0" destOrd="0" presId="urn:microsoft.com/office/officeart/2005/8/layout/hierarchy2"/>
-    <dgm:cxn modelId="{27AF9362-E21F-451C-A964-D53F36723BDA}" srcId="{276A363E-C704-4D52-9F85-35548A6AA593}" destId="{D6591959-5F0F-489A-8468-D242C17A36C8}" srcOrd="0" destOrd="0" parTransId="{779B853E-8E32-480B-8726-6D7F90F79F45}" sibTransId="{11B1830F-1949-43B7-A28A-33CB04060664}"/>
-    <dgm:cxn modelId="{EE2626C9-1E79-40BD-943C-4ADAE9826321}" type="presOf" srcId="{D6591959-5F0F-489A-8468-D242C17A36C8}" destId="{C79BEA28-5F21-4532-9188-1C7ABAA70D8F}" srcOrd="0" destOrd="0" presId="urn:microsoft.com/office/officeart/2005/8/layout/hierarchy2"/>
-    <dgm:cxn modelId="{83AE0AC5-BF21-492B-8AC5-0EDD38FBDEE3}" type="presOf" srcId="{58034E90-686B-4E9C-8AEB-2433A1E08532}" destId="{6F16B71C-2660-4279-AAE8-8E2A2C798710}" srcOrd="0" destOrd="0" presId="urn:microsoft.com/office/officeart/2005/8/layout/hierarchy2"/>
-    <dgm:cxn modelId="{A587323E-FBE6-426F-8637-91A927CE26F2}" type="presOf" srcId="{276A363E-C704-4D52-9F85-35548A6AA593}" destId="{AA82381F-3358-4A1A-9B68-C283C04A3CEB}" srcOrd="0" destOrd="0" presId="urn:microsoft.com/office/officeart/2005/8/layout/hierarchy2"/>
-    <dgm:cxn modelId="{40D62DF1-BF91-4B62-9E0E-3628428104F0}" srcId="{1C0E55F7-5FB2-4E48-8149-913E77520486}" destId="{8532AD7D-7EE2-4007-A3F5-FD348991FF6F}" srcOrd="1" destOrd="0" parTransId="{DD4D1D16-CBD2-43EE-A7C9-814070E34D3A}" sibTransId="{C4059019-8137-4DB8-AF28-E6FFB55C576F}"/>
-    <dgm:cxn modelId="{B421108B-6A37-46D2-8F4E-7F31E0A9D32F}" srcId="{58034E90-686B-4E9C-8AEB-2433A1E08532}" destId="{1C0E55F7-5FB2-4E48-8149-913E77520486}" srcOrd="0" destOrd="0" parTransId="{250126AC-706A-4CAF-AFC6-19E3D386D61D}" sibTransId="{138B2F27-93A1-4B70-8DBB-133DAC434903}"/>
-    <dgm:cxn modelId="{DA2A0E92-B307-48E4-B1C2-C75EED2E8CD2}" type="presOf" srcId="{F82C1CBE-91A2-4EF8-A552-08262AC94C07}" destId="{1A7D3E5A-6333-4372-90E5-93AD86B30A4A}" srcOrd="1" destOrd="0" presId="urn:microsoft.com/office/officeart/2005/8/layout/hierarchy2"/>
-    <dgm:cxn modelId="{AF24CD37-0DF9-45C0-AF15-642EC0DAA77E}" srcId="{8532AD7D-7EE2-4007-A3F5-FD348991FF6F}" destId="{15BB76D7-2BDA-4EDE-8F73-9D4BB2CD4971}" srcOrd="0" destOrd="0" parTransId="{F82C1CBE-91A2-4EF8-A552-08262AC94C07}" sibTransId="{444924F7-DEC1-4773-8E01-3AA584BF6495}"/>
-    <dgm:cxn modelId="{21BD81D8-CC54-4DF9-9E22-187FF8B3E52E}" type="presOf" srcId="{C9578D12-980E-4D95-810E-BC0A9848635E}" destId="{4F19358C-CCDF-4C4F-862A-0F4BA4AA4FD2}" srcOrd="1" destOrd="0" presId="urn:microsoft.com/office/officeart/2005/8/layout/hierarchy2"/>
-    <dgm:cxn modelId="{3E6931BD-56DC-445E-B034-1F0A9324CEF5}" type="presOf" srcId="{DD4D1D16-CBD2-43EE-A7C9-814070E34D3A}" destId="{89372812-2771-4395-9F3B-247111C80A40}" srcOrd="1" destOrd="0" presId="urn:microsoft.com/office/officeart/2005/8/layout/hierarchy2"/>
-    <dgm:cxn modelId="{026A628E-BCB1-47DE-AF6D-036DA013FFD5}" type="presOf" srcId="{F82C1CBE-91A2-4EF8-A552-08262AC94C07}" destId="{4EB53B17-163D-4E4E-99AA-789A7AB458C4}" srcOrd="0" destOrd="0" presId="urn:microsoft.com/office/officeart/2005/8/layout/hierarchy2"/>
-    <dgm:cxn modelId="{CE40A55A-ECFD-4168-91EE-B8C494101F3E}" srcId="{1C0E55F7-5FB2-4E48-8149-913E77520486}" destId="{276A363E-C704-4D52-9F85-35548A6AA593}" srcOrd="0" destOrd="0" parTransId="{C9578D12-980E-4D95-810E-BC0A9848635E}" sibTransId="{329C8A27-588C-434B-A7D9-B1144CC485D6}"/>
-    <dgm:cxn modelId="{12350B6C-4924-4064-BA0D-D6DAE6DD3551}" type="presOf" srcId="{DD4D1D16-CBD2-43EE-A7C9-814070E34D3A}" destId="{67F8769C-B753-45D8-B0B1-EC206E48ED9F}" srcOrd="0" destOrd="0" presId="urn:microsoft.com/office/officeart/2005/8/layout/hierarchy2"/>
     <dgm:cxn modelId="{88AF8D27-2832-44C2-BCEA-7D5075880880}" type="presOf" srcId="{779B853E-8E32-480B-8726-6D7F90F79F45}" destId="{6CBF796B-60DB-48FC-99B1-668282A960CE}" srcOrd="0" destOrd="0" presId="urn:microsoft.com/office/officeart/2005/8/layout/hierarchy2"/>
-    <dgm:cxn modelId="{302FEF1B-2DB6-4BCC-82E0-49245D471E4B}" type="presOf" srcId="{15BB76D7-2BDA-4EDE-8F73-9D4BB2CD4971}" destId="{30A78D99-01E9-4FD6-B365-8A0A655DF402}" srcOrd="0" destOrd="0" presId="urn:microsoft.com/office/officeart/2005/8/layout/hierarchy2"/>
-    <dgm:cxn modelId="{EBDF1461-CA97-4833-A590-8DD626B23D7E}" type="presOf" srcId="{779B853E-8E32-480B-8726-6D7F90F79F45}" destId="{26C445C5-4FF3-4917-9A53-77D0B357F9B8}" srcOrd="1" destOrd="0" presId="urn:microsoft.com/office/officeart/2005/8/layout/hierarchy2"/>
-    <dgm:cxn modelId="{41511535-6B13-46C2-A701-A47E7FA6CA61}" type="presOf" srcId="{8532AD7D-7EE2-4007-A3F5-FD348991FF6F}" destId="{6ADDB12E-F225-4DAA-8EEF-D28B268A5EC0}" srcOrd="0" destOrd="0" presId="urn:microsoft.com/office/officeart/2005/8/layout/hierarchy2"/>
-    <dgm:cxn modelId="{E294910F-1EC7-43F8-972B-8CC0404A3C30}" type="presOf" srcId="{1C0E55F7-5FB2-4E48-8149-913E77520486}" destId="{D50786B4-76D4-4E84-96A2-43CA01A74DF8}" srcOrd="0" destOrd="0" presId="urn:microsoft.com/office/officeart/2005/8/layout/hierarchy2"/>
     <dgm:cxn modelId="{3042C3FA-3646-497C-9376-7B65F4B1358F}" type="presParOf" srcId="{6F16B71C-2660-4279-AAE8-8E2A2C798710}" destId="{D55107E7-7B18-47C9-BBE5-4FFDE439A139}" srcOrd="0" destOrd="0" presId="urn:microsoft.com/office/officeart/2005/8/layout/hierarchy2"/>
     <dgm:cxn modelId="{7298C79F-0696-4CE0-A41A-EE8BFBC57104}" type="presParOf" srcId="{D55107E7-7B18-47C9-BBE5-4FFDE439A139}" destId="{D50786B4-76D4-4E84-96A2-43CA01A74DF8}" srcOrd="0" destOrd="0" presId="urn:microsoft.com/office/officeart/2005/8/layout/hierarchy2"/>
     <dgm:cxn modelId="{0043B9F3-1E8A-47C0-B041-D9E830E3EB68}" type="presParOf" srcId="{D55107E7-7B18-47C9-BBE5-4FFDE439A139}" destId="{19399A10-7F5B-467B-82D0-2BB2693584D2}" srcOrd="1" destOrd="0" presId="urn:microsoft.com/office/officeart/2005/8/layout/hierarchy2"/>
@@ -1267,14 +1340,14 @@
   <dgm:whole/>
   <dgm:extLst>
     <a:ext uri="http://schemas.microsoft.com/office/drawing/2008/diagram">
-      <dsp:dataModelExt xmlns:dsp="http://schemas.microsoft.com/office/drawing/2008/diagram" xmlns="" relId="rId6" minVer="http://schemas.openxmlformats.org/drawingml/2006/diagram"/>
+      <dsp:dataModelExt xmlns:dsp="http://schemas.microsoft.com/office/drawing/2008/diagram" relId="rId6" minVer="http://schemas.openxmlformats.org/drawingml/2006/diagram"/>
     </a:ext>
   </dgm:extLst>
 </dgm:dataModel>
 </file>
 
 <file path=ppt/diagrams/drawing1.xml><?xml version="1.0" encoding="utf-8"?>
-<dsp:drawing xmlns:dgm="http://schemas.openxmlformats.org/drawingml/2006/diagram" xmlns:a="http://schemas.openxmlformats.org/drawingml/2006/main" xmlns:dsp="http://schemas.microsoft.com/office/drawing/2008/diagram">
+<dsp:drawing xmlns:dgm="http://schemas.openxmlformats.org/drawingml/2006/diagram" xmlns:dsp="http://schemas.microsoft.com/office/drawing/2008/diagram" xmlns:a="http://schemas.openxmlformats.org/drawingml/2006/main">
   <dsp:spTree>
     <dsp:nvGrpSpPr>
       <dsp:cNvPr id="0" name=""/>
@@ -1356,8 +1429,8 @@
         </a:p>
       </dsp:txBody>
       <dsp:txXfrm>
-        <a:off x="4085" y="1722097"/>
-        <a:ext cx="2163534" cy="1081767"/>
+        <a:off x="35769" y="1753781"/>
+        <a:ext cx="2100166" cy="1018399"/>
       </dsp:txXfrm>
     </dsp:sp>
     <dsp:sp modelId="{2DF3C455-C390-4894-945C-5945CEDF0695}">
@@ -1434,7 +1507,7 @@
           <a:endParaRPr lang="nl-BE" sz="500" kern="1200"/>
         </a:p>
       </dsp:txBody>
-      <dsp:txXfrm rot="19457599">
+      <dsp:txXfrm>
         <a:off x="2573682" y="1925329"/>
         <a:ext cx="53288" cy="53288"/>
       </dsp:txXfrm>
@@ -1514,8 +1587,8 @@
         </a:p>
       </dsp:txBody>
       <dsp:txXfrm>
-        <a:off x="3033032" y="1100081"/>
-        <a:ext cx="2163534" cy="1081767"/>
+        <a:off x="3064716" y="1131765"/>
+        <a:ext cx="2100166" cy="1018399"/>
       </dsp:txXfrm>
     </dsp:sp>
     <dsp:sp modelId="{6CBF796B-60DB-48FC-99B1-668282A960CE}">
@@ -1648,12 +1721,12 @@
         </a:fontRef>
       </dsp:style>
       <dsp:txBody>
-        <a:bodyPr spcFirstLastPara="0" vert="horz" wrap="square" lIns="19050" tIns="19050" rIns="19050" bIns="19050" numCol="1" spcCol="1270" anchor="ctr" anchorCtr="0">
+        <a:bodyPr spcFirstLastPara="0" vert="horz" wrap="square" lIns="22225" tIns="22225" rIns="22225" bIns="22225" numCol="1" spcCol="1270" anchor="ctr" anchorCtr="0">
           <a:noAutofit/>
         </a:bodyPr>
         <a:lstStyle/>
         <a:p>
-          <a:pPr lvl="0" algn="ctr" defTabSz="1333500">
+          <a:pPr lvl="0" algn="ctr" defTabSz="1555750">
             <a:lnSpc>
               <a:spcPct val="90000"/>
             </a:lnSpc>
@@ -1665,15 +1738,15 @@
             </a:spcAft>
           </a:pPr>
           <a:r>
-            <a:rPr lang="nl-BE" sz="3000" kern="1200" dirty="0" smtClean="0"/>
+            <a:rPr lang="nl-BE" sz="3500" kern="1200" dirty="0" smtClean="0"/>
             <a:t>Live prototype</a:t>
           </a:r>
-          <a:endParaRPr lang="nl-BE" sz="3000" kern="1200" dirty="0"/>
+          <a:endParaRPr lang="nl-BE" sz="3500" kern="1200" dirty="0"/>
         </a:p>
       </dsp:txBody>
       <dsp:txXfrm>
-        <a:off x="6061980" y="1100081"/>
-        <a:ext cx="2163534" cy="1081767"/>
+        <a:off x="6093664" y="1131765"/>
+        <a:ext cx="2100166" cy="1018399"/>
       </dsp:txXfrm>
     </dsp:sp>
     <dsp:sp modelId="{67F8769C-B753-45D8-B0B1-EC206E48ED9F}">
@@ -1750,7 +1823,7 @@
           <a:endParaRPr lang="nl-BE" sz="500" kern="1200"/>
         </a:p>
       </dsp:txBody>
-      <dsp:txXfrm rot="2142401">
+      <dsp:txXfrm>
         <a:off x="2573682" y="2547345"/>
         <a:ext cx="53288" cy="53288"/>
       </dsp:txXfrm>
@@ -1830,8 +1903,8 @@
         </a:p>
       </dsp:txBody>
       <dsp:txXfrm>
-        <a:off x="3033032" y="2344114"/>
-        <a:ext cx="2163534" cy="1081767"/>
+        <a:off x="3064716" y="2375798"/>
+        <a:ext cx="2100166" cy="1018399"/>
       </dsp:txXfrm>
     </dsp:sp>
     <dsp:sp modelId="{4EB53B17-163D-4E4E-99AA-789A7AB458C4}">
@@ -1964,12 +2037,12 @@
         </a:fontRef>
       </dsp:style>
       <dsp:txBody>
-        <a:bodyPr spcFirstLastPara="0" vert="horz" wrap="square" lIns="19050" tIns="19050" rIns="19050" bIns="19050" numCol="1" spcCol="1270" anchor="ctr" anchorCtr="0">
+        <a:bodyPr spcFirstLastPara="0" vert="horz" wrap="square" lIns="22225" tIns="22225" rIns="22225" bIns="22225" numCol="1" spcCol="1270" anchor="ctr" anchorCtr="0">
           <a:noAutofit/>
         </a:bodyPr>
         <a:lstStyle/>
         <a:p>
-          <a:pPr lvl="0" algn="ctr" defTabSz="1333500">
+          <a:pPr lvl="0" algn="ctr" defTabSz="1555750">
             <a:lnSpc>
               <a:spcPct val="90000"/>
             </a:lnSpc>
@@ -1981,19 +2054,19 @@
             </a:spcAft>
           </a:pPr>
           <a:r>
-            <a:rPr lang="nl-BE" sz="3000" kern="1200" dirty="0" err="1" smtClean="0"/>
+            <a:rPr lang="nl-BE" sz="3500" kern="1200" dirty="0" err="1" smtClean="0"/>
             <a:t>goo.gl</a:t>
           </a:r>
           <a:r>
-            <a:rPr lang="nl-BE" sz="3000" kern="1200" dirty="0" smtClean="0"/>
+            <a:rPr lang="nl-BE" sz="3500" kern="1200" dirty="0" smtClean="0"/>
             <a:t>/Ycl6iG</a:t>
           </a:r>
-          <a:endParaRPr lang="nl-BE" sz="3000" kern="1200" dirty="0"/>
+          <a:endParaRPr lang="nl-BE" sz="3500" kern="1200" dirty="0"/>
         </a:p>
       </dsp:txBody>
       <dsp:txXfrm>
-        <a:off x="6061980" y="2344114"/>
-        <a:ext cx="2163534" cy="1081767"/>
+        <a:off x="6093664" y="2375798"/>
+        <a:ext cx="2100166" cy="1018399"/>
       </dsp:txXfrm>
     </dsp:sp>
   </dsp:spTree>
@@ -3354,6 +3427,524 @@
 </dgm:styleDef>
 </file>
 
+<file path=ppt/notesMasters/notesMaster1.xml><?xml version="1.0" encoding="utf-8"?>
+<p:notesMaster xmlns:a="http://schemas.openxmlformats.org/drawingml/2006/main" xmlns:r="http://schemas.openxmlformats.org/officeDocument/2006/relationships" xmlns:p="http://schemas.openxmlformats.org/presentationml/2006/main">
+  <p:cSld>
+    <p:bg>
+      <p:bgRef idx="1001">
+        <a:schemeClr val="bg1"/>
+      </p:bgRef>
+    </p:bg>
+    <p:spTree>
+      <p:nvGrpSpPr>
+        <p:cNvPr id="1" name=""/>
+        <p:cNvGrpSpPr/>
+        <p:nvPr/>
+      </p:nvGrpSpPr>
+      <p:grpSpPr>
+        <a:xfrm>
+          <a:off x="0" y="0"/>
+          <a:ext cx="0" cy="0"/>
+          <a:chOff x="0" y="0"/>
+          <a:chExt cx="0" cy="0"/>
+        </a:xfrm>
+      </p:grpSpPr>
+      <p:sp>
+        <p:nvSpPr>
+          <p:cNvPr id="2" name="Tijdelijke aanduiding voor koptekst 1"/>
+          <p:cNvSpPr>
+            <a:spLocks noGrp="1"/>
+          </p:cNvSpPr>
+          <p:nvPr>
+            <p:ph type="hdr" sz="quarter"/>
+          </p:nvPr>
+        </p:nvSpPr>
+        <p:spPr>
+          <a:xfrm>
+            <a:off x="0" y="0"/>
+            <a:ext cx="2971800" cy="457200"/>
+          </a:xfrm>
+          <a:prstGeom prst="rect">
+            <a:avLst/>
+          </a:prstGeom>
+        </p:spPr>
+        <p:txBody>
+          <a:bodyPr vert="horz" lIns="91440" tIns="45720" rIns="91440" bIns="45720" rtlCol="0"/>
+          <a:lstStyle>
+            <a:lvl1pPr algn="l">
+              <a:defRPr sz="1200"/>
+            </a:lvl1pPr>
+          </a:lstStyle>
+          <a:p>
+            <a:endParaRPr lang="nl-NL"/>
+          </a:p>
+        </p:txBody>
+      </p:sp>
+      <p:sp>
+        <p:nvSpPr>
+          <p:cNvPr id="3" name="Tijdelijke aanduiding voor datum 2"/>
+          <p:cNvSpPr>
+            <a:spLocks noGrp="1"/>
+          </p:cNvSpPr>
+          <p:nvPr>
+            <p:ph type="dt" idx="1"/>
+          </p:nvPr>
+        </p:nvSpPr>
+        <p:spPr>
+          <a:xfrm>
+            <a:off x="3884613" y="0"/>
+            <a:ext cx="2971800" cy="457200"/>
+          </a:xfrm>
+          <a:prstGeom prst="rect">
+            <a:avLst/>
+          </a:prstGeom>
+        </p:spPr>
+        <p:txBody>
+          <a:bodyPr vert="horz" lIns="91440" tIns="45720" rIns="91440" bIns="45720" rtlCol="0"/>
+          <a:lstStyle>
+            <a:lvl1pPr algn="r">
+              <a:defRPr sz="1200"/>
+            </a:lvl1pPr>
+          </a:lstStyle>
+          <a:p>
+            <a:fld id="{B6F253EA-ADA1-234C-8BB5-F01EAB85D580}" type="datetimeFigureOut">
+              <a:rPr lang="nl-NL" smtClean="0"/>
+              <a:t>20/11/14</a:t>
+            </a:fld>
+            <a:endParaRPr lang="nl-NL"/>
+          </a:p>
+        </p:txBody>
+      </p:sp>
+      <p:sp>
+        <p:nvSpPr>
+          <p:cNvPr id="4" name="Tijdelijke aanduiding voor dia-afbeelding 3"/>
+          <p:cNvSpPr>
+            <a:spLocks noGrp="1" noRot="1" noChangeAspect="1"/>
+          </p:cNvSpPr>
+          <p:nvPr>
+            <p:ph type="sldImg" idx="2"/>
+          </p:nvPr>
+        </p:nvSpPr>
+        <p:spPr>
+          <a:xfrm>
+            <a:off x="1143000" y="685800"/>
+            <a:ext cx="4572000" cy="3429000"/>
+          </a:xfrm>
+          <a:prstGeom prst="rect">
+            <a:avLst/>
+          </a:prstGeom>
+          <a:noFill/>
+          <a:ln w="12700">
+            <a:solidFill>
+              <a:prstClr val="black"/>
+            </a:solidFill>
+          </a:ln>
+        </p:spPr>
+        <p:txBody>
+          <a:bodyPr vert="horz" lIns="91440" tIns="45720" rIns="91440" bIns="45720" rtlCol="0" anchor="ctr"/>
+          <a:lstStyle/>
+          <a:p>
+            <a:endParaRPr lang="nl-NL"/>
+          </a:p>
+        </p:txBody>
+      </p:sp>
+      <p:sp>
+        <p:nvSpPr>
+          <p:cNvPr id="5" name="Tijdelijke aanduiding voor notities 4"/>
+          <p:cNvSpPr>
+            <a:spLocks noGrp="1"/>
+          </p:cNvSpPr>
+          <p:nvPr>
+            <p:ph type="body" sz="quarter" idx="3"/>
+          </p:nvPr>
+        </p:nvSpPr>
+        <p:spPr>
+          <a:xfrm>
+            <a:off x="685800" y="4343400"/>
+            <a:ext cx="5486400" cy="4114800"/>
+          </a:xfrm>
+          <a:prstGeom prst="rect">
+            <a:avLst/>
+          </a:prstGeom>
+        </p:spPr>
+        <p:txBody>
+          <a:bodyPr vert="horz" lIns="91440" tIns="45720" rIns="91440" bIns="45720" rtlCol="0"/>
+          <a:lstStyle/>
+          <a:p>
+            <a:pPr lvl="0"/>
+            <a:r>
+              <a:rPr lang="nl-BE" smtClean="0"/>
+              <a:t>Klik om de tekststijl van het model te bewerken</a:t>
+            </a:r>
+          </a:p>
+          <a:p>
+            <a:pPr lvl="1"/>
+            <a:r>
+              <a:rPr lang="nl-BE" smtClean="0"/>
+              <a:t>Tweede niveau</a:t>
+            </a:r>
+          </a:p>
+          <a:p>
+            <a:pPr lvl="2"/>
+            <a:r>
+              <a:rPr lang="nl-BE" smtClean="0"/>
+              <a:t>Derde niveau</a:t>
+            </a:r>
+          </a:p>
+          <a:p>
+            <a:pPr lvl="3"/>
+            <a:r>
+              <a:rPr lang="nl-BE" smtClean="0"/>
+              <a:t>Vierde niveau</a:t>
+            </a:r>
+          </a:p>
+          <a:p>
+            <a:pPr lvl="4"/>
+            <a:r>
+              <a:rPr lang="nl-BE" smtClean="0"/>
+              <a:t>Vijfde niveau</a:t>
+            </a:r>
+            <a:endParaRPr lang="nl-NL"/>
+          </a:p>
+        </p:txBody>
+      </p:sp>
+      <p:sp>
+        <p:nvSpPr>
+          <p:cNvPr id="6" name="Tijdelijke aanduiding voor voettekst 5"/>
+          <p:cNvSpPr>
+            <a:spLocks noGrp="1"/>
+          </p:cNvSpPr>
+          <p:nvPr>
+            <p:ph type="ftr" sz="quarter" idx="4"/>
+          </p:nvPr>
+        </p:nvSpPr>
+        <p:spPr>
+          <a:xfrm>
+            <a:off x="0" y="8685213"/>
+            <a:ext cx="2971800" cy="457200"/>
+          </a:xfrm>
+          <a:prstGeom prst="rect">
+            <a:avLst/>
+          </a:prstGeom>
+        </p:spPr>
+        <p:txBody>
+          <a:bodyPr vert="horz" lIns="91440" tIns="45720" rIns="91440" bIns="45720" rtlCol="0" anchor="b"/>
+          <a:lstStyle>
+            <a:lvl1pPr algn="l">
+              <a:defRPr sz="1200"/>
+            </a:lvl1pPr>
+          </a:lstStyle>
+          <a:p>
+            <a:endParaRPr lang="nl-NL"/>
+          </a:p>
+        </p:txBody>
+      </p:sp>
+      <p:sp>
+        <p:nvSpPr>
+          <p:cNvPr id="7" name="Tijdelijke aanduiding voor dianummer 6"/>
+          <p:cNvSpPr>
+            <a:spLocks noGrp="1"/>
+          </p:cNvSpPr>
+          <p:nvPr>
+            <p:ph type="sldNum" sz="quarter" idx="5"/>
+          </p:nvPr>
+        </p:nvSpPr>
+        <p:spPr>
+          <a:xfrm>
+            <a:off x="3884613" y="8685213"/>
+            <a:ext cx="2971800" cy="457200"/>
+          </a:xfrm>
+          <a:prstGeom prst="rect">
+            <a:avLst/>
+          </a:prstGeom>
+        </p:spPr>
+        <p:txBody>
+          <a:bodyPr vert="horz" lIns="91440" tIns="45720" rIns="91440" bIns="45720" rtlCol="0" anchor="b"/>
+          <a:lstStyle>
+            <a:lvl1pPr algn="r">
+              <a:defRPr sz="1200"/>
+            </a:lvl1pPr>
+          </a:lstStyle>
+          <a:p>
+            <a:fld id="{B1799BCE-3980-E748-93FB-0CDEF584B083}" type="slidenum">
+              <a:rPr lang="nl-NL" smtClean="0"/>
+              <a:t>‹nr.›</a:t>
+            </a:fld>
+            <a:endParaRPr lang="nl-NL"/>
+          </a:p>
+        </p:txBody>
+      </p:sp>
+    </p:spTree>
+    <p:extLst>
+      <p:ext uri="{BB962C8B-B14F-4D97-AF65-F5344CB8AC3E}">
+        <p14:creationId xmlns:p14="http://schemas.microsoft.com/office/powerpoint/2010/main" val="2599685071"/>
+      </p:ext>
+    </p:extLst>
+  </p:cSld>
+  <p:clrMap bg1="lt1" tx1="dk1" bg2="lt2" tx2="dk2" accent1="accent1" accent2="accent2" accent3="accent3" accent4="accent4" accent5="accent5" accent6="accent6" hlink="hlink" folHlink="folHlink"/>
+  <p:notesStyle>
+    <a:lvl1pPr marL="0" algn="l" defTabSz="457200" rtl="0" eaLnBrk="1" latinLnBrk="0" hangingPunct="1">
+      <a:defRPr sz="1200" kern="1200">
+        <a:solidFill>
+          <a:schemeClr val="tx1"/>
+        </a:solidFill>
+        <a:latin typeface="+mn-lt"/>
+        <a:ea typeface="+mn-ea"/>
+        <a:cs typeface="+mn-cs"/>
+      </a:defRPr>
+    </a:lvl1pPr>
+    <a:lvl2pPr marL="457200" algn="l" defTabSz="457200" rtl="0" eaLnBrk="1" latinLnBrk="0" hangingPunct="1">
+      <a:defRPr sz="1200" kern="1200">
+        <a:solidFill>
+          <a:schemeClr val="tx1"/>
+        </a:solidFill>
+        <a:latin typeface="+mn-lt"/>
+        <a:ea typeface="+mn-ea"/>
+        <a:cs typeface="+mn-cs"/>
+      </a:defRPr>
+    </a:lvl2pPr>
+    <a:lvl3pPr marL="914400" algn="l" defTabSz="457200" rtl="0" eaLnBrk="1" latinLnBrk="0" hangingPunct="1">
+      <a:defRPr sz="1200" kern="1200">
+        <a:solidFill>
+          <a:schemeClr val="tx1"/>
+        </a:solidFill>
+        <a:latin typeface="+mn-lt"/>
+        <a:ea typeface="+mn-ea"/>
+        <a:cs typeface="+mn-cs"/>
+      </a:defRPr>
+    </a:lvl3pPr>
+    <a:lvl4pPr marL="1371600" algn="l" defTabSz="457200" rtl="0" eaLnBrk="1" latinLnBrk="0" hangingPunct="1">
+      <a:defRPr sz="1200" kern="1200">
+        <a:solidFill>
+          <a:schemeClr val="tx1"/>
+        </a:solidFill>
+        <a:latin typeface="+mn-lt"/>
+        <a:ea typeface="+mn-ea"/>
+        <a:cs typeface="+mn-cs"/>
+      </a:defRPr>
+    </a:lvl4pPr>
+    <a:lvl5pPr marL="1828800" algn="l" defTabSz="457200" rtl="0" eaLnBrk="1" latinLnBrk="0" hangingPunct="1">
+      <a:defRPr sz="1200" kern="1200">
+        <a:solidFill>
+          <a:schemeClr val="tx1"/>
+        </a:solidFill>
+        <a:latin typeface="+mn-lt"/>
+        <a:ea typeface="+mn-ea"/>
+        <a:cs typeface="+mn-cs"/>
+      </a:defRPr>
+    </a:lvl5pPr>
+    <a:lvl6pPr marL="2286000" algn="l" defTabSz="457200" rtl="0" eaLnBrk="1" latinLnBrk="0" hangingPunct="1">
+      <a:defRPr sz="1200" kern="1200">
+        <a:solidFill>
+          <a:schemeClr val="tx1"/>
+        </a:solidFill>
+        <a:latin typeface="+mn-lt"/>
+        <a:ea typeface="+mn-ea"/>
+        <a:cs typeface="+mn-cs"/>
+      </a:defRPr>
+    </a:lvl6pPr>
+    <a:lvl7pPr marL="2743200" algn="l" defTabSz="457200" rtl="0" eaLnBrk="1" latinLnBrk="0" hangingPunct="1">
+      <a:defRPr sz="1200" kern="1200">
+        <a:solidFill>
+          <a:schemeClr val="tx1"/>
+        </a:solidFill>
+        <a:latin typeface="+mn-lt"/>
+        <a:ea typeface="+mn-ea"/>
+        <a:cs typeface="+mn-cs"/>
+      </a:defRPr>
+    </a:lvl7pPr>
+    <a:lvl8pPr marL="3200400" algn="l" defTabSz="457200" rtl="0" eaLnBrk="1" latinLnBrk="0" hangingPunct="1">
+      <a:defRPr sz="1200" kern="1200">
+        <a:solidFill>
+          <a:schemeClr val="tx1"/>
+        </a:solidFill>
+        <a:latin typeface="+mn-lt"/>
+        <a:ea typeface="+mn-ea"/>
+        <a:cs typeface="+mn-cs"/>
+      </a:defRPr>
+    </a:lvl8pPr>
+    <a:lvl9pPr marL="3657600" algn="l" defTabSz="457200" rtl="0" eaLnBrk="1" latinLnBrk="0" hangingPunct="1">
+      <a:defRPr sz="1200" kern="1200">
+        <a:solidFill>
+          <a:schemeClr val="tx1"/>
+        </a:solidFill>
+        <a:latin typeface="+mn-lt"/>
+        <a:ea typeface="+mn-ea"/>
+        <a:cs typeface="+mn-cs"/>
+      </a:defRPr>
+    </a:lvl9pPr>
+  </p:notesStyle>
+</p:notesMaster>
+</file>
+
+<file path=ppt/notesSlides/notesSlide1.xml><?xml version="1.0" encoding="utf-8"?>
+<p:notes xmlns:a="http://schemas.openxmlformats.org/drawingml/2006/main" xmlns:r="http://schemas.openxmlformats.org/officeDocument/2006/relationships" xmlns:p="http://schemas.openxmlformats.org/presentationml/2006/main">
+  <p:cSld>
+    <p:spTree>
+      <p:nvGrpSpPr>
+        <p:cNvPr id="1" name=""/>
+        <p:cNvGrpSpPr/>
+        <p:nvPr/>
+      </p:nvGrpSpPr>
+      <p:grpSpPr>
+        <a:xfrm>
+          <a:off x="0" y="0"/>
+          <a:ext cx="0" cy="0"/>
+          <a:chOff x="0" y="0"/>
+          <a:chExt cx="0" cy="0"/>
+        </a:xfrm>
+      </p:grpSpPr>
+      <p:sp>
+        <p:nvSpPr>
+          <p:cNvPr id="2" name="Tijdelijke aanduiding voor dia-afbeelding 1"/>
+          <p:cNvSpPr>
+            <a:spLocks noGrp="1" noRot="1" noChangeAspect="1"/>
+          </p:cNvSpPr>
+          <p:nvPr>
+            <p:ph type="sldImg"/>
+          </p:nvPr>
+        </p:nvSpPr>
+        <p:spPr/>
+      </p:sp>
+      <p:sp>
+        <p:nvSpPr>
+          <p:cNvPr id="3" name="Tijdelijke aanduiding voor notities 2"/>
+          <p:cNvSpPr>
+            <a:spLocks noGrp="1"/>
+          </p:cNvSpPr>
+          <p:nvPr>
+            <p:ph type="body" idx="1"/>
+          </p:nvPr>
+        </p:nvSpPr>
+        <p:spPr/>
+        <p:txBody>
+          <a:bodyPr/>
+          <a:lstStyle/>
+          <a:p>
+            <a:endParaRPr lang="nl-NL" dirty="0"/>
+          </a:p>
+        </p:txBody>
+      </p:sp>
+      <p:sp>
+        <p:nvSpPr>
+          <p:cNvPr id="4" name="Tijdelijke aanduiding voor dianummer 3"/>
+          <p:cNvSpPr>
+            <a:spLocks noGrp="1"/>
+          </p:cNvSpPr>
+          <p:nvPr>
+            <p:ph type="sldNum" sz="quarter" idx="10"/>
+          </p:nvPr>
+        </p:nvSpPr>
+        <p:spPr/>
+        <p:txBody>
+          <a:bodyPr/>
+          <a:lstStyle/>
+          <a:p>
+            <a:fld id="{B1799BCE-3980-E748-93FB-0CDEF584B083}" type="slidenum">
+              <a:rPr lang="nl-NL" smtClean="0"/>
+              <a:t>5</a:t>
+            </a:fld>
+            <a:endParaRPr lang="nl-NL"/>
+          </a:p>
+        </p:txBody>
+      </p:sp>
+    </p:spTree>
+    <p:extLst>
+      <p:ext uri="{BB962C8B-B14F-4D97-AF65-F5344CB8AC3E}">
+        <p14:creationId xmlns:p14="http://schemas.microsoft.com/office/powerpoint/2010/main" val="167685874"/>
+      </p:ext>
+    </p:extLst>
+  </p:cSld>
+  <p:clrMapOvr>
+    <a:masterClrMapping/>
+  </p:clrMapOvr>
+</p:notes>
+</file>
+
+<file path=ppt/notesSlides/notesSlide2.xml><?xml version="1.0" encoding="utf-8"?>
+<p:notes xmlns:a="http://schemas.openxmlformats.org/drawingml/2006/main" xmlns:r="http://schemas.openxmlformats.org/officeDocument/2006/relationships" xmlns:p="http://schemas.openxmlformats.org/presentationml/2006/main">
+  <p:cSld>
+    <p:spTree>
+      <p:nvGrpSpPr>
+        <p:cNvPr id="1" name=""/>
+        <p:cNvGrpSpPr/>
+        <p:nvPr/>
+      </p:nvGrpSpPr>
+      <p:grpSpPr>
+        <a:xfrm>
+          <a:off x="0" y="0"/>
+          <a:ext cx="0" cy="0"/>
+          <a:chOff x="0" y="0"/>
+          <a:chExt cx="0" cy="0"/>
+        </a:xfrm>
+      </p:grpSpPr>
+      <p:sp>
+        <p:nvSpPr>
+          <p:cNvPr id="2" name="Tijdelijke aanduiding voor dia-afbeelding 1"/>
+          <p:cNvSpPr>
+            <a:spLocks noGrp="1" noRot="1" noChangeAspect="1"/>
+          </p:cNvSpPr>
+          <p:nvPr>
+            <p:ph type="sldImg"/>
+          </p:nvPr>
+        </p:nvSpPr>
+        <p:spPr/>
+      </p:sp>
+      <p:sp>
+        <p:nvSpPr>
+          <p:cNvPr id="3" name="Tijdelijke aanduiding voor notities 2"/>
+          <p:cNvSpPr>
+            <a:spLocks noGrp="1"/>
+          </p:cNvSpPr>
+          <p:nvPr>
+            <p:ph type="body" idx="1"/>
+          </p:nvPr>
+        </p:nvSpPr>
+        <p:spPr/>
+        <p:txBody>
+          <a:bodyPr/>
+          <a:lstStyle/>
+          <a:p>
+            <a:endParaRPr lang="nl-NL" dirty="0"/>
+          </a:p>
+        </p:txBody>
+      </p:sp>
+      <p:sp>
+        <p:nvSpPr>
+          <p:cNvPr id="4" name="Tijdelijke aanduiding voor dianummer 3"/>
+          <p:cNvSpPr>
+            <a:spLocks noGrp="1"/>
+          </p:cNvSpPr>
+          <p:nvPr>
+            <p:ph type="sldNum" sz="quarter" idx="10"/>
+          </p:nvPr>
+        </p:nvSpPr>
+        <p:spPr/>
+        <p:txBody>
+          <a:bodyPr/>
+          <a:lstStyle/>
+          <a:p>
+            <a:fld id="{B1799BCE-3980-E748-93FB-0CDEF584B083}" type="slidenum">
+              <a:rPr lang="nl-NL" smtClean="0"/>
+              <a:t>7</a:t>
+            </a:fld>
+            <a:endParaRPr lang="nl-NL"/>
+          </a:p>
+        </p:txBody>
+      </p:sp>
+    </p:spTree>
+    <p:extLst>
+      <p:ext uri="{BB962C8B-B14F-4D97-AF65-F5344CB8AC3E}">
+        <p14:creationId xmlns:p14="http://schemas.microsoft.com/office/powerpoint/2010/main" val="2971374437"/>
+      </p:ext>
+    </p:extLst>
+  </p:cSld>
+  <p:clrMapOvr>
+    <a:masterClrMapping/>
+  </p:clrMapOvr>
+</p:notes>
+</file>
+
 <file path=ppt/slideLayouts/slideLayout1.xml><?xml version="1.0" encoding="utf-8"?>
 <p:sldLayout xmlns:a="http://schemas.openxmlformats.org/drawingml/2006/main" xmlns:r="http://schemas.openxmlformats.org/officeDocument/2006/relationships" xmlns:p="http://schemas.openxmlformats.org/presentationml/2006/main" type="title" preserve="1">
   <p:cSld name="Title Slide">
@@ -3536,7 +4127,7 @@
             <a:fld id="{C29160A7-5F71-2B44-B5DD-B5EECC5B0C89}" type="datetimeFigureOut">
               <a:rPr lang="en-US" smtClean="0"/>
               <a:pPr/>
-              <a:t>11/20/2014</a:t>
+              <a:t>20/11/14</a:t>
             </a:fld>
             <a:endParaRPr lang="nl-BE"/>
           </a:p>
@@ -3588,7 +4179,7 @@
     </p:spTree>
     <p:extLst>
       <p:ext uri="{BB962C8B-B14F-4D97-AF65-F5344CB8AC3E}">
-        <p14:creationId xmlns:p14="http://schemas.microsoft.com/office/powerpoint/2010/main" xmlns="" val="1239019115"/>
+        <p14:creationId xmlns:p14="http://schemas.microsoft.com/office/powerpoint/2010/main" val="1239019115"/>
       </p:ext>
     </p:extLst>
   </p:cSld>
@@ -3708,7 +4299,7 @@
             <a:fld id="{C29160A7-5F71-2B44-B5DD-B5EECC5B0C89}" type="datetimeFigureOut">
               <a:rPr lang="en-US" smtClean="0"/>
               <a:pPr/>
-              <a:t>11/20/2014</a:t>
+              <a:t>20/11/14</a:t>
             </a:fld>
             <a:endParaRPr lang="nl-BE"/>
           </a:p>
@@ -3760,7 +4351,7 @@
     </p:spTree>
     <p:extLst>
       <p:ext uri="{BB962C8B-B14F-4D97-AF65-F5344CB8AC3E}">
-        <p14:creationId xmlns:p14="http://schemas.microsoft.com/office/powerpoint/2010/main" xmlns="" val="23215085"/>
+        <p14:creationId xmlns:p14="http://schemas.microsoft.com/office/powerpoint/2010/main" val="23215085"/>
       </p:ext>
     </p:extLst>
   </p:cSld>
@@ -3890,7 +4481,7 @@
             <a:fld id="{C29160A7-5F71-2B44-B5DD-B5EECC5B0C89}" type="datetimeFigureOut">
               <a:rPr lang="en-US" smtClean="0"/>
               <a:pPr/>
-              <a:t>11/20/2014</a:t>
+              <a:t>20/11/14</a:t>
             </a:fld>
             <a:endParaRPr lang="nl-BE"/>
           </a:p>
@@ -3942,7 +4533,7 @@
     </p:spTree>
     <p:extLst>
       <p:ext uri="{BB962C8B-B14F-4D97-AF65-F5344CB8AC3E}">
-        <p14:creationId xmlns:p14="http://schemas.microsoft.com/office/powerpoint/2010/main" xmlns="" val="2863814101"/>
+        <p14:creationId xmlns:p14="http://schemas.microsoft.com/office/powerpoint/2010/main" val="2863814101"/>
       </p:ext>
     </p:extLst>
   </p:cSld>
@@ -4062,7 +4653,7 @@
             <a:fld id="{C29160A7-5F71-2B44-B5DD-B5EECC5B0C89}" type="datetimeFigureOut">
               <a:rPr lang="en-US" smtClean="0"/>
               <a:pPr/>
-              <a:t>11/20/2014</a:t>
+              <a:t>20/11/14</a:t>
             </a:fld>
             <a:endParaRPr lang="nl-BE"/>
           </a:p>
@@ -4114,7 +4705,7 @@
     </p:spTree>
     <p:extLst>
       <p:ext uri="{BB962C8B-B14F-4D97-AF65-F5344CB8AC3E}">
-        <p14:creationId xmlns:p14="http://schemas.microsoft.com/office/powerpoint/2010/main" xmlns="" val="3507002085"/>
+        <p14:creationId xmlns:p14="http://schemas.microsoft.com/office/powerpoint/2010/main" val="3507002085"/>
       </p:ext>
     </p:extLst>
   </p:cSld>
@@ -4310,7 +4901,7 @@
             <a:fld id="{C29160A7-5F71-2B44-B5DD-B5EECC5B0C89}" type="datetimeFigureOut">
               <a:rPr lang="en-US" smtClean="0"/>
               <a:pPr/>
-              <a:t>11/20/2014</a:t>
+              <a:t>20/11/14</a:t>
             </a:fld>
             <a:endParaRPr lang="nl-BE"/>
           </a:p>
@@ -4362,7 +4953,7 @@
     </p:spTree>
     <p:extLst>
       <p:ext uri="{BB962C8B-B14F-4D97-AF65-F5344CB8AC3E}">
-        <p14:creationId xmlns:p14="http://schemas.microsoft.com/office/powerpoint/2010/main" xmlns="" val="172103146"/>
+        <p14:creationId xmlns:p14="http://schemas.microsoft.com/office/powerpoint/2010/main" val="172103146"/>
       </p:ext>
     </p:extLst>
   </p:cSld>
@@ -4600,7 +5191,7 @@
             <a:fld id="{C29160A7-5F71-2B44-B5DD-B5EECC5B0C89}" type="datetimeFigureOut">
               <a:rPr lang="en-US" smtClean="0"/>
               <a:pPr/>
-              <a:t>11/20/2014</a:t>
+              <a:t>20/11/14</a:t>
             </a:fld>
             <a:endParaRPr lang="nl-BE"/>
           </a:p>
@@ -4652,7 +5243,7 @@
     </p:spTree>
     <p:extLst>
       <p:ext uri="{BB962C8B-B14F-4D97-AF65-F5344CB8AC3E}">
-        <p14:creationId xmlns:p14="http://schemas.microsoft.com/office/powerpoint/2010/main" xmlns="" val="3529438766"/>
+        <p14:creationId xmlns:p14="http://schemas.microsoft.com/office/powerpoint/2010/main" val="3529438766"/>
       </p:ext>
     </p:extLst>
   </p:cSld>
@@ -5024,7 +5615,7 @@
             <a:fld id="{C29160A7-5F71-2B44-B5DD-B5EECC5B0C89}" type="datetimeFigureOut">
               <a:rPr lang="en-US" smtClean="0"/>
               <a:pPr/>
-              <a:t>11/20/2014</a:t>
+              <a:t>20/11/14</a:t>
             </a:fld>
             <a:endParaRPr lang="nl-BE"/>
           </a:p>
@@ -5076,7 +5667,7 @@
     </p:spTree>
     <p:extLst>
       <p:ext uri="{BB962C8B-B14F-4D97-AF65-F5344CB8AC3E}">
-        <p14:creationId xmlns:p14="http://schemas.microsoft.com/office/powerpoint/2010/main" xmlns="" val="800563952"/>
+        <p14:creationId xmlns:p14="http://schemas.microsoft.com/office/powerpoint/2010/main" val="800563952"/>
       </p:ext>
     </p:extLst>
   </p:cSld>
@@ -5144,7 +5735,7 @@
             <a:fld id="{C29160A7-5F71-2B44-B5DD-B5EECC5B0C89}" type="datetimeFigureOut">
               <a:rPr lang="en-US" smtClean="0"/>
               <a:pPr/>
-              <a:t>11/20/2014</a:t>
+              <a:t>20/11/14</a:t>
             </a:fld>
             <a:endParaRPr lang="nl-BE"/>
           </a:p>
@@ -5196,7 +5787,7 @@
     </p:spTree>
     <p:extLst>
       <p:ext uri="{BB962C8B-B14F-4D97-AF65-F5344CB8AC3E}">
-        <p14:creationId xmlns:p14="http://schemas.microsoft.com/office/powerpoint/2010/main" xmlns="" val="1584677536"/>
+        <p14:creationId xmlns:p14="http://schemas.microsoft.com/office/powerpoint/2010/main" val="1584677536"/>
       </p:ext>
     </p:extLst>
   </p:cSld>
@@ -5241,7 +5832,7 @@
             <a:fld id="{C29160A7-5F71-2B44-B5DD-B5EECC5B0C89}" type="datetimeFigureOut">
               <a:rPr lang="en-US" smtClean="0"/>
               <a:pPr/>
-              <a:t>11/20/2014</a:t>
+              <a:t>20/11/14</a:t>
             </a:fld>
             <a:endParaRPr lang="nl-BE"/>
           </a:p>
@@ -5293,7 +5884,7 @@
     </p:spTree>
     <p:extLst>
       <p:ext uri="{BB962C8B-B14F-4D97-AF65-F5344CB8AC3E}">
-        <p14:creationId xmlns:p14="http://schemas.microsoft.com/office/powerpoint/2010/main" xmlns="" val="3462417704"/>
+        <p14:creationId xmlns:p14="http://schemas.microsoft.com/office/powerpoint/2010/main" val="3462417704"/>
       </p:ext>
     </p:extLst>
   </p:cSld>
@@ -5520,7 +6111,7 @@
             <a:fld id="{C29160A7-5F71-2B44-B5DD-B5EECC5B0C89}" type="datetimeFigureOut">
               <a:rPr lang="en-US" smtClean="0"/>
               <a:pPr/>
-              <a:t>11/20/2014</a:t>
+              <a:t>20/11/14</a:t>
             </a:fld>
             <a:endParaRPr lang="nl-BE"/>
           </a:p>
@@ -5572,7 +6163,7 @@
     </p:spTree>
     <p:extLst>
       <p:ext uri="{BB962C8B-B14F-4D97-AF65-F5344CB8AC3E}">
-        <p14:creationId xmlns:p14="http://schemas.microsoft.com/office/powerpoint/2010/main" xmlns="" val="3539016545"/>
+        <p14:creationId xmlns:p14="http://schemas.microsoft.com/office/powerpoint/2010/main" val="3539016545"/>
       </p:ext>
     </p:extLst>
   </p:cSld>
@@ -5775,7 +6366,7 @@
             <a:fld id="{C29160A7-5F71-2B44-B5DD-B5EECC5B0C89}" type="datetimeFigureOut">
               <a:rPr lang="en-US" smtClean="0"/>
               <a:pPr/>
-              <a:t>11/20/2014</a:t>
+              <a:t>20/11/14</a:t>
             </a:fld>
             <a:endParaRPr lang="nl-BE"/>
           </a:p>
@@ -5827,7 +6418,7 @@
     </p:spTree>
     <p:extLst>
       <p:ext uri="{BB962C8B-B14F-4D97-AF65-F5344CB8AC3E}">
-        <p14:creationId xmlns:p14="http://schemas.microsoft.com/office/powerpoint/2010/main" xmlns="" val="1961614620"/>
+        <p14:creationId xmlns:p14="http://schemas.microsoft.com/office/powerpoint/2010/main" val="1961614620"/>
       </p:ext>
     </p:extLst>
   </p:cSld>
@@ -5990,7 +6581,7 @@
             <a:fld id="{C29160A7-5F71-2B44-B5DD-B5EECC5B0C89}" type="datetimeFigureOut">
               <a:rPr lang="en-US" smtClean="0"/>
               <a:pPr/>
-              <a:t>11/20/2014</a:t>
+              <a:t>20/11/14</a:t>
             </a:fld>
             <a:endParaRPr lang="nl-BE"/>
           </a:p>
@@ -6078,7 +6669,7 @@
     </p:spTree>
     <p:extLst>
       <p:ext uri="{BB962C8B-B14F-4D97-AF65-F5344CB8AC3E}">
-        <p14:creationId xmlns:p14="http://schemas.microsoft.com/office/powerpoint/2010/main" xmlns="" val="3297916253"/>
+        <p14:creationId xmlns:p14="http://schemas.microsoft.com/office/powerpoint/2010/main" val="3297916253"/>
       </p:ext>
     </p:extLst>
   </p:cSld>
@@ -6415,11 +7006,7 @@
             <a:pPr fontAlgn="base"/>
             <a:r>
               <a:rPr lang="en-US" i="1" dirty="0" smtClean="0"/>
-              <a:t>PenO.3 </a:t>
-            </a:r>
-            <a:r>
-              <a:rPr lang="en-US" i="1" dirty="0" smtClean="0"/>
-              <a:t>– </a:t>
+              <a:t>PenO.3 – </a:t>
             </a:r>
             <a:r>
               <a:rPr lang="en-US" i="1" dirty="0" err="1" smtClean="0"/>
@@ -6427,13 +7014,8 @@
             </a:r>
             <a:r>
               <a:rPr lang="en-US" i="1" dirty="0" smtClean="0"/>
-              <a:t> – Faculty of </a:t>
-            </a:r>
-            <a:r>
-              <a:rPr lang="en-US" i="1" dirty="0" smtClean="0"/>
-              <a:t>Engineering</a:t>
-            </a:r>
-            <a:endParaRPr lang="en-US" i="1" dirty="0" smtClean="0"/>
+              <a:t> – Faculty of Engineering</a:t>
+            </a:r>
           </a:p>
         </p:txBody>
       </p:sp>
@@ -6466,7 +7048,7 @@
     </p:spTree>
     <p:extLst>
       <p:ext uri="{BB962C8B-B14F-4D97-AF65-F5344CB8AC3E}">
-        <p14:creationId xmlns:p14="http://schemas.microsoft.com/office/powerpoint/2010/main" xmlns="" val="871237687"/>
+        <p14:creationId xmlns:p14="http://schemas.microsoft.com/office/powerpoint/2010/main" val="871237687"/>
       </p:ext>
     </p:extLst>
   </p:cSld>
@@ -6548,7 +7130,7 @@
     </p:spTree>
     <p:extLst>
       <p:ext uri="{BB962C8B-B14F-4D97-AF65-F5344CB8AC3E}">
-        <p14:creationId xmlns:p14="http://schemas.microsoft.com/office/powerpoint/2010/main" xmlns="" val="2766676707"/>
+        <p14:creationId xmlns:p14="http://schemas.microsoft.com/office/powerpoint/2010/main" val="2766676707"/>
       </p:ext>
     </p:extLst>
   </p:cSld>
@@ -6635,7 +7217,7 @@
     </p:spTree>
     <p:extLst>
       <p:ext uri="{BB962C8B-B14F-4D97-AF65-F5344CB8AC3E}">
-        <p14:creationId xmlns:p14="http://schemas.microsoft.com/office/powerpoint/2010/main" xmlns="" val="871237687"/>
+        <p14:creationId xmlns:p14="http://schemas.microsoft.com/office/powerpoint/2010/main" val="871237687"/>
       </p:ext>
     </p:extLst>
   </p:cSld>
@@ -6708,7 +7290,7 @@
     </p:spTree>
     <p:extLst>
       <p:ext uri="{BB962C8B-B14F-4D97-AF65-F5344CB8AC3E}">
-        <p14:creationId xmlns:p14="http://schemas.microsoft.com/office/powerpoint/2010/main" xmlns="" val="216637605"/>
+        <p14:creationId xmlns:p14="http://schemas.microsoft.com/office/powerpoint/2010/main" val="216637605"/>
       </p:ext>
     </p:extLst>
   </p:cSld>
@@ -6790,7 +7372,7 @@
     </p:spTree>
     <p:extLst>
       <p:ext uri="{BB962C8B-B14F-4D97-AF65-F5344CB8AC3E}">
-        <p14:creationId xmlns:p14="http://schemas.microsoft.com/office/powerpoint/2010/main" xmlns="" val="216637605"/>
+        <p14:creationId xmlns:p14="http://schemas.microsoft.com/office/powerpoint/2010/main" val="216637605"/>
       </p:ext>
     </p:extLst>
   </p:cSld>
@@ -6895,7 +7477,7 @@
     </p:spTree>
     <p:extLst>
       <p:ext uri="{BB962C8B-B14F-4D97-AF65-F5344CB8AC3E}">
-        <p14:creationId xmlns:p14="http://schemas.microsoft.com/office/powerpoint/2010/main" xmlns="" val="3769618753"/>
+        <p14:creationId xmlns:p14="http://schemas.microsoft.com/office/powerpoint/2010/main" val="3769618753"/>
       </p:ext>
     </p:extLst>
   </p:cSld>
@@ -6995,7 +7577,7 @@
     </p:spTree>
     <p:extLst>
       <p:ext uri="{BB962C8B-B14F-4D97-AF65-F5344CB8AC3E}">
-        <p14:creationId xmlns:p14="http://schemas.microsoft.com/office/powerpoint/2010/main" xmlns="" val="3769618753"/>
+        <p14:creationId xmlns:p14="http://schemas.microsoft.com/office/powerpoint/2010/main" val="3769618753"/>
       </p:ext>
     </p:extLst>
   </p:cSld>
@@ -7099,34 +7681,27 @@
             <a:pPr lvl="1"/>
             <a:r>
               <a:rPr lang="nl-BE" dirty="0" smtClean="0"/>
-              <a:t>Harder to test without perfect data</a:t>
+              <a:t>Harder to test without </a:t>
+            </a:r>
+            <a:r>
+              <a:rPr lang="nl-BE" smtClean="0"/>
+              <a:t>perfect </a:t>
+            </a:r>
+            <a:r>
+              <a:rPr lang="nl-BE" smtClean="0"/>
+              <a:t>data</a:t>
             </a:r>
           </a:p>
           <a:p>
             <a:pPr lvl="1"/>
-            <a:r>
-              <a:rPr lang="nl-BE" dirty="0" err="1" smtClean="0"/>
-              <a:t>Bli</a:t>
-            </a:r>
             <a:endParaRPr lang="nl-BE" dirty="0" smtClean="0"/>
-          </a:p>
-          <a:p>
-            <a:pPr lvl="1"/>
-            <a:r>
-              <a:rPr lang="nl-BE" dirty="0" err="1" smtClean="0"/>
-              <a:t>Bli</a:t>
-            </a:r>
-            <a:r>
-              <a:rPr lang="nl-BE" dirty="0" smtClean="0"/>
-              <a:t> </a:t>
-            </a:r>
           </a:p>
         </p:txBody>
       </p:sp>
     </p:spTree>
     <p:extLst>
       <p:ext uri="{BB962C8B-B14F-4D97-AF65-F5344CB8AC3E}">
-        <p14:creationId xmlns:p14="http://schemas.microsoft.com/office/powerpoint/2010/main" xmlns="" val="311801143"/>
+        <p14:creationId xmlns:p14="http://schemas.microsoft.com/office/powerpoint/2010/main" val="311801143"/>
       </p:ext>
     </p:extLst>
   </p:cSld>
@@ -7214,7 +7789,7 @@
     </p:spTree>
     <p:extLst>
       <p:ext uri="{BB962C8B-B14F-4D97-AF65-F5344CB8AC3E}">
-        <p14:creationId xmlns:p14="http://schemas.microsoft.com/office/powerpoint/2010/main" xmlns="" val="311801143"/>
+        <p14:creationId xmlns:p14="http://schemas.microsoft.com/office/powerpoint/2010/main" val="311801143"/>
       </p:ext>
     </p:extLst>
   </p:cSld>
@@ -7294,7 +7869,7 @@
     </p:spTree>
     <p:extLst>
       <p:ext uri="{BB962C8B-B14F-4D97-AF65-F5344CB8AC3E}">
-        <p14:creationId xmlns:p14="http://schemas.microsoft.com/office/powerpoint/2010/main" xmlns="" val="2766676707"/>
+        <p14:creationId xmlns:p14="http://schemas.microsoft.com/office/powerpoint/2010/main" val="2766676707"/>
       </p:ext>
     </p:extLst>
   </p:cSld>
@@ -7622,4 +8197,324 @@
   </a:objectDefaults>
   <a:extraClrSchemeLst/>
 </a:theme>
+</file>
+
+<file path=ppt/theme/theme2.xml><?xml version="1.0" encoding="utf-8"?>
+<a:theme xmlns:a="http://schemas.openxmlformats.org/drawingml/2006/main" name="Office-thema">
+  <a:themeElements>
+    <a:clrScheme name="Office">
+      <a:dk1>
+        <a:sysClr val="windowText" lastClr="000000"/>
+      </a:dk1>
+      <a:lt1>
+        <a:sysClr val="window" lastClr="FFFFFF"/>
+      </a:lt1>
+      <a:dk2>
+        <a:srgbClr val="1F497D"/>
+      </a:dk2>
+      <a:lt2>
+        <a:srgbClr val="EEECE1"/>
+      </a:lt2>
+      <a:accent1>
+        <a:srgbClr val="4F81BD"/>
+      </a:accent1>
+      <a:accent2>
+        <a:srgbClr val="C0504D"/>
+      </a:accent2>
+      <a:accent3>
+        <a:srgbClr val="9BBB59"/>
+      </a:accent3>
+      <a:accent4>
+        <a:srgbClr val="8064A2"/>
+      </a:accent4>
+      <a:accent5>
+        <a:srgbClr val="4BACC6"/>
+      </a:accent5>
+      <a:accent6>
+        <a:srgbClr val="F79646"/>
+      </a:accent6>
+      <a:hlink>
+        <a:srgbClr val="0000FF"/>
+      </a:hlink>
+      <a:folHlink>
+        <a:srgbClr val="800080"/>
+      </a:folHlink>
+    </a:clrScheme>
+    <a:fontScheme name="Office">
+      <a:majorFont>
+        <a:latin typeface="Calibri"/>
+        <a:ea typeface=""/>
+        <a:cs typeface=""/>
+        <a:font script="Jpan" typeface="ＭＳ Ｐゴシック"/>
+        <a:font script="Hang" typeface="맑은 고딕"/>
+        <a:font script="Hans" typeface="宋体"/>
+        <a:font script="Hant" typeface="新細明體"/>
+        <a:font script="Arab" typeface="Times New Roman"/>
+        <a:font script="Hebr" typeface="Times New Roman"/>
+        <a:font script="Thai" typeface="Angsana New"/>
+        <a:font script="Ethi" typeface="Nyala"/>
+        <a:font script="Beng" typeface="Vrinda"/>
+        <a:font script="Gujr" typeface="Shruti"/>
+        <a:font script="Khmr" typeface="MoolBoran"/>
+        <a:font script="Knda" typeface="Tunga"/>
+        <a:font script="Guru" typeface="Raavi"/>
+        <a:font script="Cans" typeface="Euphemia"/>
+        <a:font script="Cher" typeface="Plantagenet Cherokee"/>
+        <a:font script="Yiii" typeface="Microsoft Yi Baiti"/>
+        <a:font script="Tibt" typeface="Microsoft Himalaya"/>
+        <a:font script="Thaa" typeface="MV Boli"/>
+        <a:font script="Deva" typeface="Mangal"/>
+        <a:font script="Telu" typeface="Gautami"/>
+        <a:font script="Taml" typeface="Latha"/>
+        <a:font script="Syrc" typeface="Estrangelo Edessa"/>
+        <a:font script="Orya" typeface="Kalinga"/>
+        <a:font script="Mlym" typeface="Kartika"/>
+        <a:font script="Laoo" typeface="DokChampa"/>
+        <a:font script="Sinh" typeface="Iskoola Pota"/>
+        <a:font script="Mong" typeface="Mongolian Baiti"/>
+        <a:font script="Viet" typeface="Times New Roman"/>
+        <a:font script="Uigh" typeface="Microsoft Uighur"/>
+        <a:font script="Geor" typeface="Sylfaen"/>
+      </a:majorFont>
+      <a:minorFont>
+        <a:latin typeface="Calibri"/>
+        <a:ea typeface=""/>
+        <a:cs typeface=""/>
+        <a:font script="Jpan" typeface="ＭＳ Ｐゴシック"/>
+        <a:font script="Hang" typeface="맑은 고딕"/>
+        <a:font script="Hans" typeface="宋体"/>
+        <a:font script="Hant" typeface="新細明體"/>
+        <a:font script="Arab" typeface="Arial"/>
+        <a:font script="Hebr" typeface="Arial"/>
+        <a:font script="Thai" typeface="Cordia New"/>
+        <a:font script="Ethi" typeface="Nyala"/>
+        <a:font script="Beng" typeface="Vrinda"/>
+        <a:font script="Gujr" typeface="Shruti"/>
+        <a:font script="Khmr" typeface="DaunPenh"/>
+        <a:font script="Knda" typeface="Tunga"/>
+        <a:font script="Guru" typeface="Raavi"/>
+        <a:font script="Cans" typeface="Euphemia"/>
+        <a:font script="Cher" typeface="Plantagenet Cherokee"/>
+        <a:font script="Yiii" typeface="Microsoft Yi Baiti"/>
+        <a:font script="Tibt" typeface="Microsoft Himalaya"/>
+        <a:font script="Thaa" typeface="MV Boli"/>
+        <a:font script="Deva" typeface="Mangal"/>
+        <a:font script="Telu" typeface="Gautami"/>
+        <a:font script="Taml" typeface="Latha"/>
+        <a:font script="Syrc" typeface="Estrangelo Edessa"/>
+        <a:font script="Orya" typeface="Kalinga"/>
+        <a:font script="Mlym" typeface="Kartika"/>
+        <a:font script="Laoo" typeface="DokChampa"/>
+        <a:font script="Sinh" typeface="Iskoola Pota"/>
+        <a:font script="Mong" typeface="Mongolian Baiti"/>
+        <a:font script="Viet" typeface="Arial"/>
+        <a:font script="Uigh" typeface="Microsoft Uighur"/>
+        <a:font script="Geor" typeface="Sylfaen"/>
+      </a:minorFont>
+    </a:fontScheme>
+    <a:fmtScheme name="Office">
+      <a:fillStyleLst>
+        <a:solidFill>
+          <a:schemeClr val="phClr"/>
+        </a:solidFill>
+        <a:gradFill rotWithShape="1">
+          <a:gsLst>
+            <a:gs pos="0">
+              <a:schemeClr val="phClr">
+                <a:tint val="50000"/>
+                <a:satMod val="300000"/>
+              </a:schemeClr>
+            </a:gs>
+            <a:gs pos="35000">
+              <a:schemeClr val="phClr">
+                <a:tint val="37000"/>
+                <a:satMod val="300000"/>
+              </a:schemeClr>
+            </a:gs>
+            <a:gs pos="100000">
+              <a:schemeClr val="phClr">
+                <a:tint val="15000"/>
+                <a:satMod val="350000"/>
+              </a:schemeClr>
+            </a:gs>
+          </a:gsLst>
+          <a:lin ang="16200000" scaled="1"/>
+        </a:gradFill>
+        <a:gradFill rotWithShape="1">
+          <a:gsLst>
+            <a:gs pos="0">
+              <a:schemeClr val="phClr">
+                <a:tint val="100000"/>
+                <a:shade val="100000"/>
+                <a:satMod val="130000"/>
+              </a:schemeClr>
+            </a:gs>
+            <a:gs pos="100000">
+              <a:schemeClr val="phClr">
+                <a:tint val="50000"/>
+                <a:shade val="100000"/>
+                <a:satMod val="350000"/>
+              </a:schemeClr>
+            </a:gs>
+          </a:gsLst>
+          <a:lin ang="16200000" scaled="0"/>
+        </a:gradFill>
+      </a:fillStyleLst>
+      <a:lnStyleLst>
+        <a:ln w="9525" cap="flat" cmpd="sng" algn="ctr">
+          <a:solidFill>
+            <a:schemeClr val="phClr">
+              <a:shade val="95000"/>
+              <a:satMod val="105000"/>
+            </a:schemeClr>
+          </a:solidFill>
+          <a:prstDash val="solid"/>
+        </a:ln>
+        <a:ln w="25400" cap="flat" cmpd="sng" algn="ctr">
+          <a:solidFill>
+            <a:schemeClr val="phClr"/>
+          </a:solidFill>
+          <a:prstDash val="solid"/>
+        </a:ln>
+        <a:ln w="38100" cap="flat" cmpd="sng" algn="ctr">
+          <a:solidFill>
+            <a:schemeClr val="phClr"/>
+          </a:solidFill>
+          <a:prstDash val="solid"/>
+        </a:ln>
+      </a:lnStyleLst>
+      <a:effectStyleLst>
+        <a:effectStyle>
+          <a:effectLst>
+            <a:outerShdw blurRad="40000" dist="20000" dir="5400000" rotWithShape="0">
+              <a:srgbClr val="000000">
+                <a:alpha val="38000"/>
+              </a:srgbClr>
+            </a:outerShdw>
+          </a:effectLst>
+        </a:effectStyle>
+        <a:effectStyle>
+          <a:effectLst>
+            <a:outerShdw blurRad="40000" dist="23000" dir="5400000" rotWithShape="0">
+              <a:srgbClr val="000000">
+                <a:alpha val="35000"/>
+              </a:srgbClr>
+            </a:outerShdw>
+          </a:effectLst>
+        </a:effectStyle>
+        <a:effectStyle>
+          <a:effectLst>
+            <a:outerShdw blurRad="40000" dist="23000" dir="5400000" rotWithShape="0">
+              <a:srgbClr val="000000">
+                <a:alpha val="35000"/>
+              </a:srgbClr>
+            </a:outerShdw>
+          </a:effectLst>
+          <a:scene3d>
+            <a:camera prst="orthographicFront">
+              <a:rot lat="0" lon="0" rev="0"/>
+            </a:camera>
+            <a:lightRig rig="threePt" dir="t">
+              <a:rot lat="0" lon="0" rev="1200000"/>
+            </a:lightRig>
+          </a:scene3d>
+          <a:sp3d>
+            <a:bevelT w="63500" h="25400"/>
+          </a:sp3d>
+        </a:effectStyle>
+      </a:effectStyleLst>
+      <a:bgFillStyleLst>
+        <a:solidFill>
+          <a:schemeClr val="phClr"/>
+        </a:solidFill>
+        <a:gradFill rotWithShape="1">
+          <a:gsLst>
+            <a:gs pos="0">
+              <a:schemeClr val="phClr">
+                <a:tint val="40000"/>
+                <a:satMod val="350000"/>
+              </a:schemeClr>
+            </a:gs>
+            <a:gs pos="40000">
+              <a:schemeClr val="phClr">
+                <a:tint val="45000"/>
+                <a:shade val="99000"/>
+                <a:satMod val="350000"/>
+              </a:schemeClr>
+            </a:gs>
+            <a:gs pos="100000">
+              <a:schemeClr val="phClr">
+                <a:shade val="20000"/>
+                <a:satMod val="255000"/>
+              </a:schemeClr>
+            </a:gs>
+          </a:gsLst>
+          <a:path path="circle">
+            <a:fillToRect l="50000" t="-80000" r="50000" b="180000"/>
+          </a:path>
+        </a:gradFill>
+        <a:gradFill rotWithShape="1">
+          <a:gsLst>
+            <a:gs pos="0">
+              <a:schemeClr val="phClr">
+                <a:tint val="80000"/>
+                <a:satMod val="300000"/>
+              </a:schemeClr>
+            </a:gs>
+            <a:gs pos="100000">
+              <a:schemeClr val="phClr">
+                <a:shade val="30000"/>
+                <a:satMod val="200000"/>
+              </a:schemeClr>
+            </a:gs>
+          </a:gsLst>
+          <a:path path="circle">
+            <a:fillToRect l="50000" t="50000" r="50000" b="50000"/>
+          </a:path>
+        </a:gradFill>
+      </a:bgFillStyleLst>
+    </a:fmtScheme>
+  </a:themeElements>
+  <a:objectDefaults>
+    <a:spDef>
+      <a:spPr/>
+      <a:bodyPr/>
+      <a:lstStyle/>
+      <a:style>
+        <a:lnRef idx="1">
+          <a:schemeClr val="accent1"/>
+        </a:lnRef>
+        <a:fillRef idx="3">
+          <a:schemeClr val="accent1"/>
+        </a:fillRef>
+        <a:effectRef idx="2">
+          <a:schemeClr val="accent1"/>
+        </a:effectRef>
+        <a:fontRef idx="minor">
+          <a:schemeClr val="lt1"/>
+        </a:fontRef>
+      </a:style>
+    </a:spDef>
+    <a:lnDef>
+      <a:spPr/>
+      <a:bodyPr/>
+      <a:lstStyle/>
+      <a:style>
+        <a:lnRef idx="2">
+          <a:schemeClr val="accent1"/>
+        </a:lnRef>
+        <a:fillRef idx="0">
+          <a:schemeClr val="accent1"/>
+        </a:fillRef>
+        <a:effectRef idx="1">
+          <a:schemeClr val="accent1"/>
+        </a:effectRef>
+        <a:fontRef idx="minor">
+          <a:schemeClr val="tx1"/>
+        </a:fontRef>
+      </a:style>
+    </a:lnDef>
+  </a:objectDefaults>
+  <a:extraClrSchemeLst/>
+</a:theme>
 </file>
</xml_diff>